<commit_message>
Dynamic scheduling foils updated
</commit_message>
<xml_diff>
--- a/foils/arch/DynamicScheduling.pptx
+++ b/foils/arch/DynamicScheduling.pptx
@@ -5,7 +5,7 @@
     <p:sldMasterId id="2147483652" r:id="rId1"/>
   </p:sldMasterIdLst>
   <p:notesMasterIdLst>
-    <p:notesMasterId r:id="rId10"/>
+    <p:notesMasterId r:id="rId13"/>
   </p:notesMasterIdLst>
   <p:sldIdLst>
     <p:sldId id="256" r:id="rId2"/>
@@ -15,7 +15,10 @@
     <p:sldId id="373" r:id="rId6"/>
     <p:sldId id="372" r:id="rId7"/>
     <p:sldId id="375" r:id="rId8"/>
-    <p:sldId id="361" r:id="rId9"/>
+    <p:sldId id="377" r:id="rId9"/>
+    <p:sldId id="376" r:id="rId10"/>
+    <p:sldId id="378" r:id="rId11"/>
+    <p:sldId id="361" r:id="rId12"/>
   </p:sldIdLst>
   <p:sldSz cx="9144000" cy="6858000" type="screen4x3"/>
   <p:notesSz cx="7150100" cy="9448800"/>
@@ -762,7 +765,7 @@
             <a:fld id="{D509CBAA-709D-4418-9DB0-8210BB6F4820}" type="slidenum">
               <a:rPr lang="en-US" smtClean="0"/>
               <a:pPr/>
-              <a:t>8</a:t>
+              <a:t>11</a:t>
             </a:fld>
             <a:endParaRPr lang="en-US" smtClean="0"/>
           </a:p>
@@ -3425,6 +3428,218 @@
 </p:sld>
 </file>
 
+<file path=ppt/slides/slide10.xml><?xml version="1.0" encoding="utf-8"?>
+<p:sld xmlns:a="http://schemas.openxmlformats.org/drawingml/2006/main" xmlns:r="http://schemas.openxmlformats.org/officeDocument/2006/relationships" xmlns:p="http://schemas.openxmlformats.org/presentationml/2006/main">
+  <p:cSld>
+    <p:spTree>
+      <p:nvGrpSpPr>
+        <p:cNvPr id="1" name=""/>
+        <p:cNvGrpSpPr/>
+        <p:nvPr/>
+      </p:nvGrpSpPr>
+      <p:grpSpPr>
+        <a:xfrm>
+          <a:off x="0" y="0"/>
+          <a:ext cx="0" cy="0"/>
+          <a:chOff x="0" y="0"/>
+          <a:chExt cx="0" cy="0"/>
+        </a:xfrm>
+      </p:grpSpPr>
+      <p:sp>
+        <p:nvSpPr>
+          <p:cNvPr id="28674" name="Rectangle 2"/>
+          <p:cNvSpPr>
+            <a:spLocks noGrp="1" noChangeArrowheads="1"/>
+          </p:cNvSpPr>
+          <p:nvPr>
+            <p:ph type="title" idx="4294967295"/>
+          </p:nvPr>
+        </p:nvSpPr>
+        <p:spPr/>
+        <p:txBody>
+          <a:bodyPr/>
+          <a:lstStyle/>
+          <a:p>
+            <a:pPr eaLnBrk="1" hangingPunct="1"/>
+            <a:r>
+              <a:rPr lang="en-US" dirty="0" smtClean="0"/>
+              <a:t>Demo</a:t>
+            </a:r>
+          </a:p>
+        </p:txBody>
+      </p:sp>
+      <p:sp>
+        <p:nvSpPr>
+          <p:cNvPr id="5" name="Rectangle 3"/>
+          <p:cNvSpPr txBox="1">
+            <a:spLocks noChangeArrowheads="1"/>
+          </p:cNvSpPr>
+          <p:nvPr/>
+        </p:nvSpPr>
+        <p:spPr bwMode="auto">
+          <a:xfrm>
+            <a:off x="376590" y="2156179"/>
+            <a:ext cx="8338431" cy="530577"/>
+          </a:xfrm>
+          <a:prstGeom prst="rect">
+            <a:avLst/>
+          </a:prstGeom>
+          <a:noFill/>
+          <a:ln w="9525">
+            <a:noFill/>
+            <a:miter lim="800000"/>
+            <a:headEnd/>
+            <a:tailEnd/>
+          </a:ln>
+        </p:spPr>
+        <p:txBody>
+          <a:bodyPr vert="horz" wrap="square" lIns="0" tIns="0" rIns="0" bIns="0" numCol="1" anchor="t" anchorCtr="0" compatLnSpc="1">
+            <a:prstTxWarp prst="textNoShape">
+              <a:avLst/>
+            </a:prstTxWarp>
+          </a:bodyPr>
+          <a:lstStyle/>
+          <a:p>
+            <a:pPr marL="225425" marR="0" lvl="0" indent="-225425" defTabSz="914400" rtl="0" eaLnBrk="1" fontAlgn="base" latinLnBrk="0" hangingPunct="1">
+              <a:lnSpc>
+                <a:spcPct val="100000"/>
+              </a:lnSpc>
+              <a:spcBef>
+                <a:spcPct val="20000"/>
+              </a:spcBef>
+              <a:spcAft>
+                <a:spcPct val="0"/>
+              </a:spcAft>
+              <a:buClrTx/>
+              <a:buSzTx/>
+              <a:buFontTx/>
+              <a:buNone/>
+              <a:tabLst/>
+              <a:defRPr/>
+            </a:pPr>
+            <a:r>
+              <a:rPr kumimoji="0" lang="en-US" sz="2000" b="0" i="0" u="none" strike="noStrike" kern="0" cap="none" spc="0" normalizeH="0" baseline="0" noProof="0" dirty="0" smtClean="0">
+                <a:ln>
+                  <a:noFill/>
+                </a:ln>
+                <a:solidFill>
+                  <a:schemeClr val="tx1"/>
+                </a:solidFill>
+                <a:effectLst/>
+                <a:uLnTx/>
+                <a:uFillTx/>
+                <a:latin typeface="+mn-lt"/>
+                <a:ea typeface="+mn-ea"/>
+                <a:cs typeface="+mn-cs"/>
+                <a:hlinkClick r:id="rId2"/>
+              </a:rPr>
+              <a:t>Reorder buffer</a:t>
+            </a:r>
+            <a:r>
+              <a:rPr kumimoji="0" lang="en-US" sz="2000" b="0" i="0" u="none" strike="noStrike" kern="0" cap="none" spc="0" normalizeH="0" baseline="0" noProof="0" dirty="0" smtClean="0">
+                <a:ln>
+                  <a:noFill/>
+                </a:ln>
+                <a:solidFill>
+                  <a:schemeClr val="tx1"/>
+                </a:solidFill>
+                <a:effectLst/>
+                <a:uLnTx/>
+                <a:uFillTx/>
+                <a:latin typeface="+mn-lt"/>
+                <a:ea typeface="+mn-ea"/>
+                <a:cs typeface="+mn-cs"/>
+              </a:rPr>
+              <a:t> </a:t>
+            </a:r>
+          </a:p>
+        </p:txBody>
+      </p:sp>
+    </p:spTree>
+  </p:cSld>
+  <p:clrMapOvr>
+    <a:masterClrMapping/>
+  </p:clrMapOvr>
+  <p:transition>
+    <p:fade/>
+  </p:transition>
+  <p:timing>
+    <p:tnLst>
+      <p:par>
+        <p:cTn id="1" dur="indefinite" restart="never" nodeType="tmRoot"/>
+      </p:par>
+    </p:tnLst>
+  </p:timing>
+</p:sld>
+</file>
+
+<file path=ppt/slides/slide11.xml><?xml version="1.0" encoding="utf-8"?>
+<p:sld xmlns:a="http://schemas.openxmlformats.org/drawingml/2006/main" xmlns:r="http://schemas.openxmlformats.org/officeDocument/2006/relationships" xmlns:p="http://schemas.openxmlformats.org/presentationml/2006/main" showMasterSp="0">
+  <p:cSld>
+    <p:spTree>
+      <p:nvGrpSpPr>
+        <p:cNvPr id="1" name=""/>
+        <p:cNvGrpSpPr/>
+        <p:nvPr/>
+      </p:nvGrpSpPr>
+      <p:grpSpPr>
+        <a:xfrm>
+          <a:off x="0" y="0"/>
+          <a:ext cx="0" cy="0"/>
+          <a:chOff x="0" y="0"/>
+          <a:chExt cx="0" cy="0"/>
+        </a:xfrm>
+      </p:grpSpPr>
+      <p:pic>
+        <p:nvPicPr>
+          <p:cNvPr id="9218" name="Picture 4" descr="intel_rgb_1700tag"/>
+          <p:cNvPicPr>
+            <a:picLocks noChangeAspect="1" noChangeArrowheads="1"/>
+          </p:cNvPicPr>
+          <p:nvPr/>
+        </p:nvPicPr>
+        <p:blipFill>
+          <a:blip r:embed="rId3" cstate="print"/>
+          <a:srcRect/>
+          <a:stretch>
+            <a:fillRect/>
+          </a:stretch>
+        </p:blipFill>
+        <p:spPr bwMode="auto">
+          <a:xfrm>
+            <a:off x="765175" y="1430338"/>
+            <a:ext cx="7751763" cy="4008437"/>
+          </a:xfrm>
+          <a:prstGeom prst="rect">
+            <a:avLst/>
+          </a:prstGeom>
+          <a:noFill/>
+          <a:ln w="9525">
+            <a:noFill/>
+            <a:miter lim="800000"/>
+            <a:headEnd/>
+            <a:tailEnd/>
+          </a:ln>
+        </p:spPr>
+      </p:pic>
+    </p:spTree>
+  </p:cSld>
+  <p:clrMapOvr>
+    <a:masterClrMapping/>
+  </p:clrMapOvr>
+  <p:transition>
+    <p:fade/>
+  </p:transition>
+  <p:timing>
+    <p:tnLst>
+      <p:par>
+        <p:cTn id="1" dur="indefinite" restart="never" nodeType="tmRoot"/>
+      </p:par>
+    </p:tnLst>
+  </p:timing>
+</p:sld>
+</file>
+
 <file path=ppt/slides/slide2.xml><?xml version="1.0" encoding="utf-8"?>
 <p:sld xmlns:a="http://schemas.openxmlformats.org/drawingml/2006/main" xmlns:r="http://schemas.openxmlformats.org/officeDocument/2006/relationships" xmlns:p="http://schemas.openxmlformats.org/presentationml/2006/main">
   <p:cSld>
@@ -3508,13 +3723,8 @@
             <a:pPr eaLnBrk="1" hangingPunct="1"/>
             <a:r>
               <a:rPr lang="en-US" dirty="0" smtClean="0"/>
-              <a:t>Implementation in </a:t>
-            </a:r>
-            <a:r>
-              <a:rPr lang="en-US" dirty="0" smtClean="0"/>
-              <a:t>hardware</a:t>
-            </a:r>
-            <a:endParaRPr lang="en-US" dirty="0" smtClean="0"/>
+              <a:t>Implementation in hardware</a:t>
+            </a:r>
           </a:p>
           <a:p>
             <a:pPr eaLnBrk="1" hangingPunct="1"/>
@@ -3522,6 +3732,21 @@
               <a:rPr lang="en-US" dirty="0" smtClean="0"/>
               <a:t>Demo</a:t>
             </a:r>
+          </a:p>
+          <a:p>
+            <a:pPr eaLnBrk="1" hangingPunct="1"/>
+            <a:r>
+              <a:rPr lang="en-US" dirty="0" smtClean="0"/>
+              <a:t>Hardware speculation</a:t>
+            </a:r>
+          </a:p>
+          <a:p>
+            <a:pPr eaLnBrk="1" hangingPunct="1"/>
+            <a:r>
+              <a:rPr lang="en-US" dirty="0" smtClean="0"/>
+              <a:t>Demo</a:t>
+            </a:r>
+            <a:endParaRPr lang="en-US" dirty="0" smtClean="0"/>
           </a:p>
         </p:txBody>
       </p:sp>
@@ -5715,13 +5940,8 @@
             <a:pPr eaLnBrk="1" hangingPunct="1"/>
             <a:r>
               <a:rPr lang="en-US" dirty="0" smtClean="0"/>
-              <a:t>Implementation in </a:t>
-            </a:r>
-            <a:r>
-              <a:rPr lang="en-US" dirty="0" smtClean="0"/>
-              <a:t>HW</a:t>
-            </a:r>
-            <a:endParaRPr lang="en-US" dirty="0" smtClean="0"/>
+              <a:t>Implementation in HW</a:t>
+            </a:r>
           </a:p>
         </p:txBody>
       </p:sp>
@@ -5969,17 +6189,8 @@
               <a:rPr lang="en-US" kern="0" dirty="0" smtClean="0">
                 <a:latin typeface="+mn-lt"/>
               </a:rPr>
-              <a:t> = </a:t>
-            </a:r>
-            <a:r>
-              <a:rPr lang="en-US" kern="0" dirty="0" smtClean="0">
-                <a:latin typeface="+mn-lt"/>
-              </a:rPr>
-              <a:t>R2, 2</a:t>
-            </a:r>
-            <a:endParaRPr lang="en-US" kern="0" dirty="0" smtClean="0">
-              <a:latin typeface="+mn-lt"/>
-            </a:endParaRPr>
+              <a:t> = R2, 2</a:t>
+            </a:r>
           </a:p>
           <a:p>
             <a:pPr marL="225425" marR="0" lvl="0" indent="-225425" algn="l" defTabSz="914400" rtl="0" eaLnBrk="0" fontAlgn="base" latinLnBrk="0" hangingPunct="0">
@@ -6248,7 +6459,7 @@
 </file>
 
 <file path=ppt/slides/slide8.xml><?xml version="1.0" encoding="utf-8"?>
-<p:sld xmlns:a="http://schemas.openxmlformats.org/drawingml/2006/main" xmlns:r="http://schemas.openxmlformats.org/officeDocument/2006/relationships" xmlns:p="http://schemas.openxmlformats.org/presentationml/2006/main" showMasterSp="0">
+<p:sld xmlns:a="http://schemas.openxmlformats.org/drawingml/2006/main" xmlns:r="http://schemas.openxmlformats.org/officeDocument/2006/relationships" xmlns:p="http://schemas.openxmlformats.org/presentationml/2006/main">
   <p:cSld>
     <p:spTree>
       <p:nvGrpSpPr>
@@ -6264,16 +6475,420 @@
           <a:chExt cx="0" cy="0"/>
         </a:xfrm>
       </p:grpSpPr>
+      <p:sp>
+        <p:nvSpPr>
+          <p:cNvPr id="28674" name="Rectangle 2"/>
+          <p:cNvSpPr>
+            <a:spLocks noGrp="1" noChangeArrowheads="1"/>
+          </p:cNvSpPr>
+          <p:nvPr>
+            <p:ph type="title" idx="4294967295"/>
+          </p:nvPr>
+        </p:nvSpPr>
+        <p:spPr/>
+        <p:txBody>
+          <a:bodyPr/>
+          <a:lstStyle/>
+          <a:p>
+            <a:pPr eaLnBrk="1" hangingPunct="1"/>
+            <a:r>
+              <a:rPr lang="en-US" dirty="0" smtClean="0"/>
+              <a:t>Hardware speculation</a:t>
+            </a:r>
+          </a:p>
+        </p:txBody>
+      </p:sp>
+      <p:sp>
+        <p:nvSpPr>
+          <p:cNvPr id="4" name="Rectangle 3"/>
+          <p:cNvSpPr txBox="1">
+            <a:spLocks noChangeArrowheads="1"/>
+          </p:cNvSpPr>
+          <p:nvPr/>
+        </p:nvSpPr>
+        <p:spPr>
+          <a:xfrm>
+            <a:off x="455613" y="964669"/>
+            <a:ext cx="8237537" cy="4840287"/>
+          </a:xfrm>
+          <a:prstGeom prst="rect">
+            <a:avLst/>
+          </a:prstGeom>
+        </p:spPr>
+        <p:txBody>
+          <a:bodyPr/>
+          <a:lstStyle/>
+          <a:p>
+            <a:pPr marL="225425" marR="0" lvl="0" indent="-225425" algn="l" defTabSz="914400" rtl="0" eaLnBrk="1" fontAlgn="base" latinLnBrk="0" hangingPunct="1">
+              <a:lnSpc>
+                <a:spcPct val="100000"/>
+              </a:lnSpc>
+              <a:spcBef>
+                <a:spcPct val="20000"/>
+              </a:spcBef>
+              <a:spcAft>
+                <a:spcPct val="0"/>
+              </a:spcAft>
+              <a:buClrTx/>
+              <a:buSzTx/>
+              <a:buFontTx/>
+              <a:buChar char="•"/>
+              <a:tabLst/>
+              <a:defRPr/>
+            </a:pPr>
+            <a:r>
+              <a:rPr lang="en-US" sz="2400" kern="0" dirty="0" smtClean="0">
+                <a:latin typeface="+mn-lt"/>
+              </a:rPr>
+              <a:t>Based on 3 key ideas:</a:t>
+            </a:r>
+          </a:p>
+          <a:p>
+            <a:pPr marL="682625" lvl="1" indent="-225425" algn="l" eaLnBrk="1" hangingPunct="1">
+              <a:lnSpc>
+                <a:spcPct val="100000"/>
+              </a:lnSpc>
+              <a:spcBef>
+                <a:spcPct val="20000"/>
+              </a:spcBef>
+              <a:buFontTx/>
+              <a:buChar char="•"/>
+            </a:pPr>
+            <a:r>
+              <a:rPr kumimoji="0" lang="en-US" b="0" i="0" u="none" strike="noStrike" kern="0" cap="none" spc="0" normalizeH="0" baseline="0" noProof="0" dirty="0" smtClean="0">
+                <a:ln>
+                  <a:noFill/>
+                </a:ln>
+                <a:solidFill>
+                  <a:schemeClr val="tx1"/>
+                </a:solidFill>
+                <a:effectLst/>
+                <a:uLnTx/>
+                <a:uFillTx/>
+                <a:latin typeface="+mn-lt"/>
+                <a:ea typeface="+mn-ea"/>
+                <a:cs typeface="+mn-cs"/>
+              </a:rPr>
+              <a:t>Dynamic</a:t>
+            </a:r>
+            <a:r>
+              <a:rPr kumimoji="0" lang="en-US" b="0" i="0" u="none" strike="noStrike" kern="0" cap="none" spc="0" normalizeH="0" noProof="0" dirty="0" smtClean="0">
+                <a:ln>
+                  <a:noFill/>
+                </a:ln>
+                <a:solidFill>
+                  <a:schemeClr val="tx1"/>
+                </a:solidFill>
+                <a:effectLst/>
+                <a:uLnTx/>
+                <a:uFillTx/>
+                <a:latin typeface="+mn-lt"/>
+                <a:ea typeface="+mn-ea"/>
+                <a:cs typeface="+mn-cs"/>
+              </a:rPr>
+              <a:t> branch prediction</a:t>
+            </a:r>
+          </a:p>
+          <a:p>
+            <a:pPr marL="682625" lvl="1" indent="-225425" algn="l" eaLnBrk="1" hangingPunct="1">
+              <a:lnSpc>
+                <a:spcPct val="100000"/>
+              </a:lnSpc>
+              <a:spcBef>
+                <a:spcPct val="20000"/>
+              </a:spcBef>
+              <a:buFontTx/>
+              <a:buChar char="•"/>
+            </a:pPr>
+            <a:r>
+              <a:rPr lang="en-US" kern="0" baseline="0" dirty="0" smtClean="0">
+                <a:latin typeface="+mn-lt"/>
+              </a:rPr>
+              <a:t>Speculative</a:t>
+            </a:r>
+            <a:r>
+              <a:rPr lang="en-US" kern="0" dirty="0" smtClean="0">
+                <a:latin typeface="+mn-lt"/>
+              </a:rPr>
+              <a:t> execution</a:t>
+            </a:r>
+          </a:p>
+          <a:p>
+            <a:pPr marL="682625" lvl="1" indent="-225425" algn="l" eaLnBrk="1" hangingPunct="1">
+              <a:lnSpc>
+                <a:spcPct val="100000"/>
+              </a:lnSpc>
+              <a:spcBef>
+                <a:spcPct val="20000"/>
+              </a:spcBef>
+              <a:buFontTx/>
+              <a:buChar char="•"/>
+            </a:pPr>
+            <a:r>
+              <a:rPr kumimoji="0" lang="en-US" b="0" i="0" u="none" strike="noStrike" kern="0" cap="none" spc="0" normalizeH="0" baseline="0" noProof="0" dirty="0" smtClean="0">
+                <a:ln>
+                  <a:noFill/>
+                </a:ln>
+                <a:solidFill>
+                  <a:schemeClr val="tx1"/>
+                </a:solidFill>
+                <a:effectLst/>
+                <a:uLnTx/>
+                <a:uFillTx/>
+                <a:latin typeface="+mn-lt"/>
+                <a:ea typeface="+mn-ea"/>
+                <a:cs typeface="+mn-cs"/>
+              </a:rPr>
+              <a:t>Dynamic</a:t>
+            </a:r>
+            <a:r>
+              <a:rPr kumimoji="0" lang="en-US" b="0" i="0" u="none" strike="noStrike" kern="0" cap="none" spc="0" normalizeH="0" noProof="0" dirty="0" smtClean="0">
+                <a:ln>
+                  <a:noFill/>
+                </a:ln>
+                <a:solidFill>
+                  <a:schemeClr val="tx1"/>
+                </a:solidFill>
+                <a:effectLst/>
+                <a:uLnTx/>
+                <a:uFillTx/>
+                <a:latin typeface="+mn-lt"/>
+                <a:ea typeface="+mn-ea"/>
+                <a:cs typeface="+mn-cs"/>
+              </a:rPr>
+              <a:t> scheduling</a:t>
+            </a:r>
+          </a:p>
+          <a:p>
+            <a:pPr marL="682625" lvl="1" indent="-225425" algn="l" eaLnBrk="1" hangingPunct="1">
+              <a:lnSpc>
+                <a:spcPct val="100000"/>
+              </a:lnSpc>
+              <a:spcBef>
+                <a:spcPct val="20000"/>
+              </a:spcBef>
+              <a:buFontTx/>
+              <a:buChar char="•"/>
+            </a:pPr>
+            <a:endParaRPr kumimoji="0" lang="en-US" b="0" i="0" u="none" strike="noStrike" kern="0" cap="none" spc="0" normalizeH="0" noProof="0" dirty="0" smtClean="0">
+              <a:ln>
+                <a:noFill/>
+              </a:ln>
+              <a:solidFill>
+                <a:schemeClr val="tx1"/>
+              </a:solidFill>
+              <a:effectLst/>
+              <a:uLnTx/>
+              <a:uFillTx/>
+              <a:latin typeface="+mn-lt"/>
+              <a:ea typeface="+mn-ea"/>
+              <a:cs typeface="+mn-cs"/>
+            </a:endParaRPr>
+          </a:p>
+          <a:p>
+            <a:pPr marL="225425" indent="-225425" algn="l" eaLnBrk="1" hangingPunct="1">
+              <a:lnSpc>
+                <a:spcPct val="100000"/>
+              </a:lnSpc>
+              <a:spcBef>
+                <a:spcPct val="20000"/>
+              </a:spcBef>
+              <a:buFontTx/>
+              <a:buChar char="•"/>
+            </a:pPr>
+            <a:r>
+              <a:rPr lang="en-US" sz="2400" kern="0" dirty="0" smtClean="0"/>
+              <a:t>Extra stage: </a:t>
+            </a:r>
+            <a:r>
+              <a:rPr lang="en-US" sz="2400" b="1" kern="0" dirty="0" smtClean="0"/>
+              <a:t>instruction commit</a:t>
+            </a:r>
+          </a:p>
+          <a:p>
+            <a:pPr marL="225425" indent="-225425" algn="l" eaLnBrk="1" hangingPunct="1">
+              <a:lnSpc>
+                <a:spcPct val="100000"/>
+              </a:lnSpc>
+              <a:spcBef>
+                <a:spcPct val="20000"/>
+              </a:spcBef>
+              <a:buFontTx/>
+              <a:buChar char="•"/>
+            </a:pPr>
+            <a:endParaRPr lang="en-US" sz="2400" kern="0" dirty="0" smtClean="0">
+              <a:latin typeface="+mn-lt"/>
+            </a:endParaRPr>
+          </a:p>
+          <a:p>
+            <a:pPr marL="225425" indent="-225425" algn="l" eaLnBrk="1" hangingPunct="1">
+              <a:lnSpc>
+                <a:spcPct val="100000"/>
+              </a:lnSpc>
+              <a:spcBef>
+                <a:spcPct val="20000"/>
+              </a:spcBef>
+              <a:buFontTx/>
+              <a:buChar char="•"/>
+            </a:pPr>
+            <a:endParaRPr lang="en-US" sz="2400" kern="0" dirty="0" smtClean="0">
+              <a:latin typeface="+mn-lt"/>
+            </a:endParaRPr>
+          </a:p>
+          <a:p>
+            <a:pPr marL="225425" indent="-225425" algn="l" eaLnBrk="1" hangingPunct="1">
+              <a:lnSpc>
+                <a:spcPct val="100000"/>
+              </a:lnSpc>
+              <a:spcBef>
+                <a:spcPct val="20000"/>
+              </a:spcBef>
+              <a:buFontTx/>
+              <a:buChar char="•"/>
+            </a:pPr>
+            <a:endParaRPr lang="en-US" sz="2400" kern="0" dirty="0" smtClean="0">
+              <a:latin typeface="+mn-lt"/>
+            </a:endParaRPr>
+          </a:p>
+          <a:p>
+            <a:pPr marL="225425" indent="-225425" algn="l" eaLnBrk="1" hangingPunct="1">
+              <a:lnSpc>
+                <a:spcPct val="100000"/>
+              </a:lnSpc>
+              <a:spcBef>
+                <a:spcPct val="20000"/>
+              </a:spcBef>
+              <a:buFontTx/>
+              <a:buChar char="•"/>
+            </a:pPr>
+            <a:r>
+              <a:rPr lang="en-US" sz="2400" kern="0" dirty="0" smtClean="0">
+                <a:latin typeface="+mn-lt"/>
+              </a:rPr>
+              <a:t>New</a:t>
+            </a:r>
+            <a:r>
+              <a:rPr lang="en-US" sz="2400" kern="0" noProof="0" dirty="0" smtClean="0">
+                <a:latin typeface="+mn-lt"/>
+              </a:rPr>
+              <a:t> buffer</a:t>
+            </a:r>
+            <a:r>
+              <a:rPr kumimoji="0" lang="en-US" sz="2400" b="0" i="0" u="none" strike="noStrike" kern="0" cap="none" spc="0" normalizeH="0" baseline="0" noProof="0" dirty="0" smtClean="0">
+                <a:ln>
+                  <a:noFill/>
+                </a:ln>
+                <a:effectLst/>
+                <a:uLnTx/>
+                <a:uFillTx/>
+                <a:latin typeface="+mn-lt"/>
+                <a:ea typeface="+mn-ea"/>
+                <a:cs typeface="+mn-cs"/>
+              </a:rPr>
+              <a:t>: </a:t>
+            </a:r>
+            <a:r>
+              <a:rPr lang="en-US" sz="2400" b="1" kern="0" dirty="0" smtClean="0">
+                <a:latin typeface="+mn-lt"/>
+              </a:rPr>
+              <a:t>ROB (reorder buffer)</a:t>
+            </a:r>
+            <a:endParaRPr kumimoji="0" lang="en-US" sz="2400" b="1" u="none" strike="noStrike" kern="0" cap="none" spc="0" normalizeH="0" baseline="0" noProof="0" dirty="0" smtClean="0">
+              <a:ln>
+                <a:noFill/>
+              </a:ln>
+              <a:effectLst/>
+              <a:uLnTx/>
+              <a:uFillTx/>
+              <a:latin typeface="+mn-lt"/>
+              <a:ea typeface="+mn-ea"/>
+              <a:cs typeface="+mn-cs"/>
+            </a:endParaRPr>
+          </a:p>
+        </p:txBody>
+      </p:sp>
+      <p:sp>
+        <p:nvSpPr>
+          <p:cNvPr id="5" name="Rectangle 3"/>
+          <p:cNvSpPr txBox="1">
+            <a:spLocks noChangeArrowheads="1"/>
+          </p:cNvSpPr>
+          <p:nvPr/>
+        </p:nvSpPr>
+        <p:spPr>
+          <a:xfrm>
+            <a:off x="1059568" y="3719689"/>
+            <a:ext cx="1378832" cy="468490"/>
+          </a:xfrm>
+          <a:prstGeom prst="rect">
+            <a:avLst/>
+          </a:prstGeom>
+        </p:spPr>
+        <p:txBody>
+          <a:bodyPr/>
+          <a:lstStyle/>
+          <a:p>
+            <a:pPr marL="225425" marR="0" lvl="0" indent="-225425" algn="l" defTabSz="914400" rtl="0" eaLnBrk="0" fontAlgn="base" latinLnBrk="0" hangingPunct="0">
+              <a:lnSpc>
+                <a:spcPct val="100000"/>
+              </a:lnSpc>
+              <a:spcBef>
+                <a:spcPct val="20000"/>
+              </a:spcBef>
+              <a:spcAft>
+                <a:spcPct val="0"/>
+              </a:spcAft>
+              <a:buClrTx/>
+              <a:buSzTx/>
+              <a:buFontTx/>
+              <a:buNone/>
+              <a:tabLst/>
+              <a:defRPr/>
+            </a:pPr>
+            <a:r>
+              <a:rPr kumimoji="0" lang="en-US" i="0" u="none" strike="noStrike" kern="0" cap="none" spc="0" normalizeH="0" baseline="0" noProof="0" dirty="0" smtClean="0">
+                <a:ln>
+                  <a:noFill/>
+                </a:ln>
+                <a:solidFill>
+                  <a:schemeClr val="tx1"/>
+                </a:solidFill>
+                <a:effectLst/>
+                <a:uLnTx/>
+                <a:uFillTx/>
+                <a:latin typeface="+mn-lt"/>
+                <a:ea typeface="+mn-ea"/>
+                <a:cs typeface="+mn-cs"/>
+              </a:rPr>
+              <a:t>Pipeline</a:t>
+            </a:r>
+            <a:endParaRPr kumimoji="0" lang="en-US" sz="2400" b="1" i="0" u="none" strike="noStrike" kern="0" cap="none" spc="0" normalizeH="0" baseline="0" noProof="0" dirty="0" smtClean="0">
+              <a:ln>
+                <a:noFill/>
+              </a:ln>
+              <a:solidFill>
+                <a:schemeClr val="tx1"/>
+              </a:solidFill>
+              <a:effectLst/>
+              <a:uLnTx/>
+              <a:uFillTx/>
+              <a:latin typeface="+mn-lt"/>
+              <a:ea typeface="+mn-ea"/>
+              <a:cs typeface="+mn-cs"/>
+            </a:endParaRPr>
+          </a:p>
+        </p:txBody>
+      </p:sp>
       <p:pic>
         <p:nvPicPr>
-          <p:cNvPr id="9218" name="Picture 4" descr="intel_rgb_1700tag"/>
+          <p:cNvPr id="1027" name="Picture 3"/>
           <p:cNvPicPr>
             <a:picLocks noChangeAspect="1" noChangeArrowheads="1"/>
           </p:cNvPicPr>
           <p:nvPr/>
         </p:nvPicPr>
         <p:blipFill>
-          <a:blip r:embed="rId3" cstate="print"/>
+          <a:blip r:embed="rId2" cstate="print"/>
           <a:srcRect/>
           <a:stretch>
             <a:fillRect/>
@@ -6281,8 +6896,8 @@
         </p:blipFill>
         <p:spPr bwMode="auto">
           <a:xfrm>
-            <a:off x="765175" y="1430338"/>
-            <a:ext cx="7751763" cy="4008437"/>
+            <a:off x="2449512" y="3581579"/>
+            <a:ext cx="5057775" cy="733425"/>
           </a:xfrm>
           <a:prstGeom prst="rect">
             <a:avLst/>
@@ -6294,6 +6909,88 @@
             <a:headEnd/>
             <a:tailEnd/>
           </a:ln>
+        </p:spPr>
+      </p:pic>
+    </p:spTree>
+  </p:cSld>
+  <p:clrMapOvr>
+    <a:masterClrMapping/>
+  </p:clrMapOvr>
+  <p:transition>
+    <p:fade/>
+  </p:transition>
+  <p:timing>
+    <p:tnLst>
+      <p:par>
+        <p:cTn id="1" dur="indefinite" restart="never" nodeType="tmRoot"/>
+      </p:par>
+    </p:tnLst>
+  </p:timing>
+</p:sld>
+</file>
+
+<file path=ppt/slides/slide9.xml><?xml version="1.0" encoding="utf-8"?>
+<p:sld xmlns:a="http://schemas.openxmlformats.org/drawingml/2006/main" xmlns:r="http://schemas.openxmlformats.org/officeDocument/2006/relationships" xmlns:p="http://schemas.openxmlformats.org/presentationml/2006/main">
+  <p:cSld>
+    <p:spTree>
+      <p:nvGrpSpPr>
+        <p:cNvPr id="1" name=""/>
+        <p:cNvGrpSpPr/>
+        <p:nvPr/>
+      </p:nvGrpSpPr>
+      <p:grpSpPr>
+        <a:xfrm>
+          <a:off x="0" y="0"/>
+          <a:ext cx="0" cy="0"/>
+          <a:chOff x="0" y="0"/>
+          <a:chExt cx="0" cy="0"/>
+        </a:xfrm>
+      </p:grpSpPr>
+      <p:sp>
+        <p:nvSpPr>
+          <p:cNvPr id="28674" name="Rectangle 2"/>
+          <p:cNvSpPr>
+            <a:spLocks noGrp="1" noChangeArrowheads="1"/>
+          </p:cNvSpPr>
+          <p:nvPr>
+            <p:ph type="title" idx="4294967295"/>
+          </p:nvPr>
+        </p:nvSpPr>
+        <p:spPr/>
+        <p:txBody>
+          <a:bodyPr/>
+          <a:lstStyle/>
+          <a:p>
+            <a:pPr eaLnBrk="1" hangingPunct="1"/>
+            <a:r>
+              <a:rPr lang="en-US" dirty="0" smtClean="0"/>
+              <a:t>Hardware speculation</a:t>
+            </a:r>
+          </a:p>
+        </p:txBody>
+      </p:sp>
+      <p:pic>
+        <p:nvPicPr>
+          <p:cNvPr id="6" name="Picture 5" descr="ScreenHunter_01 Apr. 17 15.14.gif"/>
+          <p:cNvPicPr>
+            <a:picLocks noChangeAspect="1"/>
+          </p:cNvPicPr>
+          <p:nvPr/>
+        </p:nvPicPr>
+        <p:blipFill>
+          <a:blip r:embed="rId2" cstate="print"/>
+          <a:stretch>
+            <a:fillRect/>
+          </a:stretch>
+        </p:blipFill>
+        <p:spPr>
+          <a:xfrm>
+            <a:off x="1600759" y="711198"/>
+            <a:ext cx="5996663" cy="5911329"/>
+          </a:xfrm>
+          <a:prstGeom prst="rect">
+            <a:avLst/>
+          </a:prstGeom>
         </p:spPr>
       </p:pic>
     </p:spTree>

</xml_diff>